<commit_message>
changes in power point
</commit_message>
<xml_diff>
--- a/Documents/TelasPadrõesProjeto.pptx
+++ b/Documents/TelasPadrõesProjeto.pptx
@@ -5211,13 +5211,6 @@
               </a:rPr>
               <a:t>Você trabalha? Com oque?</a:t>
             </a:r>
-            <a:endParaRPr lang="pt-BR" sz="1050" dirty="0" smtClean="0">
-              <a:solidFill>
-                <a:schemeClr val="tx2">
-                  <a:lumMod val="75000"/>
-                </a:schemeClr>
-              </a:solidFill>
-            </a:endParaRPr>
           </a:p>
         </p:txBody>
       </p:sp>
@@ -6286,11 +6279,6 @@
               </a:rPr>
               <a:t>Remover</a:t>
             </a:r>
-            <a:endParaRPr lang="pt-BR" sz="1050" dirty="0" smtClean="0">
-              <a:solidFill>
-                <a:schemeClr val="bg1"/>
-              </a:solidFill>
-            </a:endParaRPr>
           </a:p>
         </p:txBody>
       </p:sp>
@@ -6467,17 +6455,7 @@
                   </a:schemeClr>
                 </a:solidFill>
               </a:rPr>
-              <a:t>Alternativa </a:t>
-            </a:r>
-            <a:r>
-              <a:rPr lang="pt-BR" sz="900" dirty="0" smtClean="0">
-                <a:solidFill>
-                  <a:schemeClr val="tx2">
-                    <a:lumMod val="75000"/>
-                  </a:schemeClr>
-                </a:solidFill>
-              </a:rPr>
-              <a:t>D</a:t>
+              <a:t>Alternativa D</a:t>
             </a:r>
             <a:endParaRPr lang="pt-BR" sz="1000" dirty="0" smtClean="0">
               <a:solidFill>
@@ -6542,11 +6520,6 @@
               </a:rPr>
               <a:t>Competências</a:t>
             </a:r>
-            <a:endParaRPr lang="pt-BR" sz="1100" dirty="0" smtClean="0">
-              <a:solidFill>
-                <a:schemeClr val="bg1"/>
-              </a:solidFill>
-            </a:endParaRPr>
           </a:p>
         </p:txBody>
       </p:sp>
@@ -6771,11 +6744,6 @@
               </a:rPr>
               <a:t>Competências</a:t>
             </a:r>
-            <a:endParaRPr lang="pt-BR" sz="1100" dirty="0" smtClean="0">
-              <a:solidFill>
-                <a:schemeClr val="bg1"/>
-              </a:solidFill>
-            </a:endParaRPr>
           </a:p>
         </p:txBody>
       </p:sp>
@@ -6832,11 +6800,6 @@
               </a:rPr>
               <a:t>Competências</a:t>
             </a:r>
-            <a:endParaRPr lang="pt-BR" sz="1100" dirty="0" smtClean="0">
-              <a:solidFill>
-                <a:schemeClr val="bg1"/>
-              </a:solidFill>
-            </a:endParaRPr>
           </a:p>
         </p:txBody>
       </p:sp>
@@ -7606,13 +7569,6 @@
               </a:rPr>
               <a:t>Você trabalha? Com oque?</a:t>
             </a:r>
-            <a:endParaRPr lang="pt-BR" sz="1050" dirty="0" smtClean="0">
-              <a:solidFill>
-                <a:schemeClr val="tx2">
-                  <a:lumMod val="75000"/>
-                </a:schemeClr>
-              </a:solidFill>
-            </a:endParaRPr>
           </a:p>
         </p:txBody>
       </p:sp>
@@ -8681,11 +8637,6 @@
               </a:rPr>
               <a:t>Remover</a:t>
             </a:r>
-            <a:endParaRPr lang="pt-BR" sz="1050" dirty="0" smtClean="0">
-              <a:solidFill>
-                <a:schemeClr val="bg1"/>
-              </a:solidFill>
-            </a:endParaRPr>
           </a:p>
         </p:txBody>
       </p:sp>
@@ -8921,11 +8872,6 @@
               </a:rPr>
               <a:t>Competências</a:t>
             </a:r>
-            <a:endParaRPr lang="pt-BR" sz="1100" dirty="0" smtClean="0">
-              <a:solidFill>
-                <a:schemeClr val="bg1"/>
-              </a:solidFill>
-            </a:endParaRPr>
           </a:p>
         </p:txBody>
       </p:sp>
@@ -9150,11 +9096,6 @@
               </a:rPr>
               <a:t>Competências</a:t>
             </a:r>
-            <a:endParaRPr lang="pt-BR" sz="1100" dirty="0" smtClean="0">
-              <a:solidFill>
-                <a:schemeClr val="bg1"/>
-              </a:solidFill>
-            </a:endParaRPr>
           </a:p>
         </p:txBody>
       </p:sp>
@@ -9211,11 +9152,6 @@
               </a:rPr>
               <a:t>Competências</a:t>
             </a:r>
-            <a:endParaRPr lang="pt-BR" sz="1100" dirty="0" smtClean="0">
-              <a:solidFill>
-                <a:schemeClr val="bg1"/>
-              </a:solidFill>
-            </a:endParaRPr>
           </a:p>
         </p:txBody>
       </p:sp>
@@ -9272,11 +9208,6 @@
               </a:rPr>
               <a:t>Competências</a:t>
             </a:r>
-            <a:endParaRPr lang="pt-BR" sz="1100" dirty="0" smtClean="0">
-              <a:solidFill>
-                <a:schemeClr val="bg1"/>
-              </a:solidFill>
-            </a:endParaRPr>
           </a:p>
         </p:txBody>
       </p:sp>
@@ -9449,13 +9380,6 @@
               </a:rPr>
               <a:t>Liderança</a:t>
             </a:r>
-            <a:endParaRPr lang="pt-BR" sz="1000" dirty="0" smtClean="0">
-              <a:solidFill>
-                <a:schemeClr val="tx2">
-                  <a:lumMod val="75000"/>
-                </a:schemeClr>
-              </a:solidFill>
-            </a:endParaRPr>
           </a:p>
         </p:txBody>
       </p:sp>
@@ -9584,18 +9508,7 @@
                 </a:solidFill>
                 <a:latin typeface="+mj-lt"/>
               </a:rPr>
-              <a:t>Competências</a:t>
-            </a:r>
-            <a:r>
-              <a:rPr lang="pt-BR" sz="2000" dirty="0" smtClean="0">
-                <a:solidFill>
-                  <a:schemeClr val="tx2">
-                    <a:lumMod val="50000"/>
-                  </a:schemeClr>
-                </a:solidFill>
-                <a:latin typeface="+mj-lt"/>
-              </a:rPr>
-              <a:t> </a:t>
+              <a:t>Competências </a:t>
             </a:r>
             <a:endParaRPr lang="pt-BR" sz="2800" dirty="0">
               <a:solidFill>
@@ -9854,6 +9767,118 @@
               </a:rPr>
               <a:t>Determinação</a:t>
             </a:r>
+          </a:p>
+        </p:txBody>
+      </p:sp>
+      <p:sp>
+        <p:nvSpPr>
+          <p:cNvPr id="73" name="CaixaDeTexto 72"/>
+          <p:cNvSpPr txBox="1"/>
+          <p:nvPr/>
+        </p:nvSpPr>
+        <p:spPr>
+          <a:xfrm>
+            <a:off x="3563772" y="2692975"/>
+            <a:ext cx="1669934" cy="246221"/>
+          </a:xfrm>
+          <a:prstGeom prst="rect">
+            <a:avLst/>
+          </a:prstGeom>
+          <a:ln w="19050">
+            <a:solidFill>
+              <a:schemeClr val="tx2">
+                <a:lumMod val="75000"/>
+              </a:schemeClr>
+            </a:solidFill>
+          </a:ln>
+          <a:effectLst/>
+        </p:spPr>
+        <p:style>
+          <a:lnRef idx="2">
+            <a:schemeClr val="accent5"/>
+          </a:lnRef>
+          <a:fillRef idx="1">
+            <a:schemeClr val="lt1"/>
+          </a:fillRef>
+          <a:effectRef idx="0">
+            <a:schemeClr val="accent5"/>
+          </a:effectRef>
+          <a:fontRef idx="minor">
+            <a:schemeClr val="dk1"/>
+          </a:fontRef>
+        </p:style>
+        <p:txBody>
+          <a:bodyPr wrap="square" rtlCol="0">
+            <a:spAutoFit/>
+          </a:bodyPr>
+          <a:lstStyle/>
+          <a:p>
+            <a:r>
+              <a:rPr lang="pt-BR" sz="1000" dirty="0" smtClean="0">
+                <a:solidFill>
+                  <a:schemeClr val="tx2">
+                    <a:lumMod val="75000"/>
+                  </a:schemeClr>
+                </a:solidFill>
+              </a:rPr>
+              <a:t>Comunicação</a:t>
+            </a:r>
+          </a:p>
+        </p:txBody>
+      </p:sp>
+      <p:sp>
+        <p:nvSpPr>
+          <p:cNvPr id="74" name="CaixaDeTexto 73"/>
+          <p:cNvSpPr txBox="1"/>
+          <p:nvPr/>
+        </p:nvSpPr>
+        <p:spPr>
+          <a:xfrm>
+            <a:off x="3563772" y="4271599"/>
+            <a:ext cx="1669934" cy="246221"/>
+          </a:xfrm>
+          <a:prstGeom prst="rect">
+            <a:avLst/>
+          </a:prstGeom>
+          <a:ln w="19050">
+            <a:solidFill>
+              <a:schemeClr val="tx2">
+                <a:lumMod val="75000"/>
+              </a:schemeClr>
+            </a:solidFill>
+          </a:ln>
+          <a:effectLst/>
+        </p:spPr>
+        <p:style>
+          <a:lnRef idx="2">
+            <a:schemeClr val="accent5"/>
+          </a:lnRef>
+          <a:fillRef idx="1">
+            <a:schemeClr val="lt1"/>
+          </a:fillRef>
+          <a:effectRef idx="0">
+            <a:schemeClr val="accent5"/>
+          </a:effectRef>
+          <a:fontRef idx="minor">
+            <a:schemeClr val="dk1"/>
+          </a:fontRef>
+        </p:style>
+        <p:txBody>
+          <a:bodyPr wrap="square" rtlCol="0">
+            <a:spAutoFit/>
+          </a:bodyPr>
+          <a:lstStyle/>
+          <a:p>
+            <a:r>
+              <a:rPr lang="pt-BR" sz="1000">
+                <a:solidFill>
+                  <a:schemeClr val="tx2">
+                    <a:lumMod val="75000"/>
+                  </a:schemeClr>
+                </a:solidFill>
+              </a:rPr>
+              <a:t>Gerenciar Tempo </a:t>
+            </a:r>
             <a:endParaRPr lang="pt-BR" sz="1000" dirty="0" smtClean="0">
               <a:solidFill>
                 <a:schemeClr val="tx2">
@@ -9866,13 +9891,13 @@
       </p:sp>
       <p:sp>
         <p:nvSpPr>
-          <p:cNvPr id="73" name="CaixaDeTexto 72"/>
-          <p:cNvSpPr txBox="1"/>
-          <p:nvPr/>
-        </p:nvSpPr>
-        <p:spPr>
-          <a:xfrm>
-            <a:off x="3563772" y="2692975"/>
+          <p:cNvPr id="75" name="CaixaDeTexto 74"/>
+          <p:cNvSpPr txBox="1"/>
+          <p:nvPr/>
+        </p:nvSpPr>
+        <p:spPr>
+          <a:xfrm>
+            <a:off x="3565806" y="3130082"/>
             <a:ext cx="1669934" cy="246221"/>
           </a:xfrm>
           <a:prstGeom prst="rect">
@@ -9915,27 +9940,20 @@
                   </a:schemeClr>
                 </a:solidFill>
               </a:rPr>
-              <a:t>Comunicação</a:t>
-            </a:r>
-            <a:endParaRPr lang="pt-BR" sz="1000" dirty="0" smtClean="0">
-              <a:solidFill>
-                <a:schemeClr val="tx2">
-                  <a:lumMod val="75000"/>
-                </a:schemeClr>
-              </a:solidFill>
-            </a:endParaRPr>
-          </a:p>
-        </p:txBody>
-      </p:sp>
-      <p:sp>
-        <p:nvSpPr>
-          <p:cNvPr id="74" name="CaixaDeTexto 73"/>
-          <p:cNvSpPr txBox="1"/>
-          <p:nvPr/>
-        </p:nvSpPr>
-        <p:spPr>
-          <a:xfrm>
-            <a:off x="3563772" y="4271599"/>
+              <a:t>Trabalho em grupo</a:t>
+            </a:r>
+          </a:p>
+        </p:txBody>
+      </p:sp>
+      <p:sp>
+        <p:nvSpPr>
+          <p:cNvPr id="76" name="CaixaDeTexto 75"/>
+          <p:cNvSpPr txBox="1"/>
+          <p:nvPr/>
+        </p:nvSpPr>
+        <p:spPr>
+          <a:xfrm>
+            <a:off x="3563772" y="3516688"/>
             <a:ext cx="1669934" cy="246221"/>
           </a:xfrm>
           <a:prstGeom prst="rect">
@@ -9971,148 +9989,15 @@
           <a:lstStyle/>
           <a:p>
             <a:r>
-              <a:rPr lang="pt-BR" sz="1000">
+              <a:rPr lang="pt-BR" sz="1000" dirty="0" smtClean="0">
                 <a:solidFill>
                   <a:schemeClr val="tx2">
                     <a:lumMod val="75000"/>
                   </a:schemeClr>
                 </a:solidFill>
               </a:rPr>
-              <a:t>Gerenciar Tempo </a:t>
-            </a:r>
-            <a:endParaRPr lang="pt-BR" sz="1000" dirty="0" smtClean="0">
-              <a:solidFill>
-                <a:schemeClr val="tx2">
-                  <a:lumMod val="75000"/>
-                </a:schemeClr>
-              </a:solidFill>
-            </a:endParaRPr>
-          </a:p>
-        </p:txBody>
-      </p:sp>
-      <p:sp>
-        <p:nvSpPr>
-          <p:cNvPr id="75" name="CaixaDeTexto 74"/>
-          <p:cNvSpPr txBox="1"/>
-          <p:nvPr/>
-        </p:nvSpPr>
-        <p:spPr>
-          <a:xfrm>
-            <a:off x="3565806" y="3130082"/>
-            <a:ext cx="1669934" cy="246221"/>
-          </a:xfrm>
-          <a:prstGeom prst="rect">
-            <a:avLst/>
-          </a:prstGeom>
-          <a:ln w="19050">
-            <a:solidFill>
-              <a:schemeClr val="tx2">
-                <a:lumMod val="75000"/>
-              </a:schemeClr>
-            </a:solidFill>
-          </a:ln>
-          <a:effectLst/>
-        </p:spPr>
-        <p:style>
-          <a:lnRef idx="2">
-            <a:schemeClr val="accent5"/>
-          </a:lnRef>
-          <a:fillRef idx="1">
-            <a:schemeClr val="lt1"/>
-          </a:fillRef>
-          <a:effectRef idx="0">
-            <a:schemeClr val="accent5"/>
-          </a:effectRef>
-          <a:fontRef idx="minor">
-            <a:schemeClr val="dk1"/>
-          </a:fontRef>
-        </p:style>
-        <p:txBody>
-          <a:bodyPr wrap="square" rtlCol="0">
-            <a:spAutoFit/>
-          </a:bodyPr>
-          <a:lstStyle/>
-          <a:p>
-            <a:r>
-              <a:rPr lang="pt-BR" sz="1000" dirty="0" smtClean="0">
-                <a:solidFill>
-                  <a:schemeClr val="tx2">
-                    <a:lumMod val="75000"/>
-                  </a:schemeClr>
-                </a:solidFill>
-              </a:rPr>
-              <a:t>Trabalho em grupo</a:t>
-            </a:r>
-            <a:endParaRPr lang="pt-BR" sz="1000" dirty="0" smtClean="0">
-              <a:solidFill>
-                <a:schemeClr val="tx2">
-                  <a:lumMod val="75000"/>
-                </a:schemeClr>
-              </a:solidFill>
-            </a:endParaRPr>
-          </a:p>
-        </p:txBody>
-      </p:sp>
-      <p:sp>
-        <p:nvSpPr>
-          <p:cNvPr id="76" name="CaixaDeTexto 75"/>
-          <p:cNvSpPr txBox="1"/>
-          <p:nvPr/>
-        </p:nvSpPr>
-        <p:spPr>
-          <a:xfrm>
-            <a:off x="3563772" y="3516688"/>
-            <a:ext cx="1669934" cy="246221"/>
-          </a:xfrm>
-          <a:prstGeom prst="rect">
-            <a:avLst/>
-          </a:prstGeom>
-          <a:ln w="19050">
-            <a:solidFill>
-              <a:schemeClr val="tx2">
-                <a:lumMod val="75000"/>
-              </a:schemeClr>
-            </a:solidFill>
-          </a:ln>
-          <a:effectLst/>
-        </p:spPr>
-        <p:style>
-          <a:lnRef idx="2">
-            <a:schemeClr val="accent5"/>
-          </a:lnRef>
-          <a:fillRef idx="1">
-            <a:schemeClr val="lt1"/>
-          </a:fillRef>
-          <a:effectRef idx="0">
-            <a:schemeClr val="accent5"/>
-          </a:effectRef>
-          <a:fontRef idx="minor">
-            <a:schemeClr val="dk1"/>
-          </a:fontRef>
-        </p:style>
-        <p:txBody>
-          <a:bodyPr wrap="square" rtlCol="0">
-            <a:spAutoFit/>
-          </a:bodyPr>
-          <a:lstStyle/>
-          <a:p>
-            <a:r>
-              <a:rPr lang="pt-BR" sz="1000" dirty="0" smtClean="0">
-                <a:solidFill>
-                  <a:schemeClr val="tx2">
-                    <a:lumMod val="75000"/>
-                  </a:schemeClr>
-                </a:solidFill>
-              </a:rPr>
               <a:t>Criatividade</a:t>
             </a:r>
-            <a:endParaRPr lang="pt-BR" sz="1000" dirty="0" smtClean="0">
-              <a:solidFill>
-                <a:schemeClr val="tx2">
-                  <a:lumMod val="75000"/>
-                </a:schemeClr>
-              </a:solidFill>
-            </a:endParaRPr>
           </a:p>
         </p:txBody>
       </p:sp>
@@ -10383,13 +10268,6 @@
               </a:rPr>
               <a:t>5</a:t>
             </a:r>
-            <a:endParaRPr lang="pt-BR" sz="1000" dirty="0" smtClean="0">
-              <a:solidFill>
-                <a:schemeClr val="tx2">
-                  <a:lumMod val="75000"/>
-                </a:schemeClr>
-              </a:solidFill>
-            </a:endParaRPr>
           </a:p>
         </p:txBody>
       </p:sp>
@@ -10446,13 +10324,6 @@
               </a:rPr>
               <a:t>7</a:t>
             </a:r>
-            <a:endParaRPr lang="pt-BR" sz="1000" dirty="0" smtClean="0">
-              <a:solidFill>
-                <a:schemeClr val="tx2">
-                  <a:lumMod val="75000"/>
-                </a:schemeClr>
-              </a:solidFill>
-            </a:endParaRPr>
           </a:p>
         </p:txBody>
       </p:sp>
@@ -10509,13 +10380,6 @@
               </a:rPr>
               <a:t>10</a:t>
             </a:r>
-            <a:endParaRPr lang="pt-BR" sz="1000" dirty="0" smtClean="0">
-              <a:solidFill>
-                <a:schemeClr val="tx2">
-                  <a:lumMod val="75000"/>
-                </a:schemeClr>
-              </a:solidFill>
-            </a:endParaRPr>
           </a:p>
         </p:txBody>
       </p:sp>
@@ -10572,13 +10436,6 @@
               </a:rPr>
               <a:t>6</a:t>
             </a:r>
-            <a:endParaRPr lang="pt-BR" sz="1000" dirty="0" smtClean="0">
-              <a:solidFill>
-                <a:schemeClr val="tx2">
-                  <a:lumMod val="75000"/>
-                </a:schemeClr>
-              </a:solidFill>
-            </a:endParaRPr>
           </a:p>
         </p:txBody>
       </p:sp>
@@ -10635,13 +10492,6 @@
               </a:rPr>
               <a:t>2</a:t>
             </a:r>
-            <a:endParaRPr lang="pt-BR" sz="1000" dirty="0" smtClean="0">
-              <a:solidFill>
-                <a:schemeClr val="tx2">
-                  <a:lumMod val="75000"/>
-                </a:schemeClr>
-              </a:solidFill>
-            </a:endParaRPr>
           </a:p>
         </p:txBody>
       </p:sp>
@@ -10698,13 +10548,6 @@
               </a:rPr>
               <a:t>0</a:t>
             </a:r>
-            <a:endParaRPr lang="pt-BR" sz="1000" dirty="0" smtClean="0">
-              <a:solidFill>
-                <a:schemeClr val="tx2">
-                  <a:lumMod val="75000"/>
-                </a:schemeClr>
-              </a:solidFill>
-            </a:endParaRPr>
           </a:p>
         </p:txBody>
       </p:sp>
@@ -17952,11 +17795,6 @@
               </a:rPr>
               <a:t>Remover</a:t>
             </a:r>
-            <a:endParaRPr lang="pt-BR" sz="1050" dirty="0" smtClean="0">
-              <a:solidFill>
-                <a:schemeClr val="bg1"/>
-              </a:solidFill>
-            </a:endParaRPr>
           </a:p>
         </p:txBody>
       </p:sp>
@@ -18726,13 +18564,6 @@
               </a:rPr>
               <a:t>Você trabalha? Com oque?</a:t>
             </a:r>
-            <a:endParaRPr lang="pt-BR" sz="1050" dirty="0" smtClean="0">
-              <a:solidFill>
-                <a:schemeClr val="tx2">
-                  <a:lumMod val="75000"/>
-                </a:schemeClr>
-              </a:solidFill>
-            </a:endParaRPr>
           </a:p>
         </p:txBody>
       </p:sp>
@@ -19801,11 +19632,6 @@
               </a:rPr>
               <a:t>Remover</a:t>
             </a:r>
-            <a:endParaRPr lang="pt-BR" sz="1050" dirty="0" smtClean="0">
-              <a:solidFill>
-                <a:schemeClr val="bg1"/>
-              </a:solidFill>
-            </a:endParaRPr>
           </a:p>
         </p:txBody>
       </p:sp>
@@ -20006,17 +19832,7 @@
                   </a:schemeClr>
                 </a:solidFill>
               </a:rPr>
-              <a:t>Alternativa </a:t>
-            </a:r>
-            <a:r>
-              <a:rPr lang="pt-BR" sz="900" dirty="0" smtClean="0">
-                <a:solidFill>
-                  <a:schemeClr val="tx2">
-                    <a:lumMod val="75000"/>
-                  </a:schemeClr>
-                </a:solidFill>
-              </a:rPr>
-              <a:t>D</a:t>
+              <a:t>Alternativa D</a:t>
             </a:r>
             <a:endParaRPr lang="pt-BR" sz="1000" dirty="0" smtClean="0">
               <a:solidFill>
@@ -20081,11 +19897,6 @@
               </a:rPr>
               <a:t>Competências</a:t>
             </a:r>
-            <a:endParaRPr lang="pt-BR" sz="1100" dirty="0" smtClean="0">
-              <a:solidFill>
-                <a:schemeClr val="bg1"/>
-              </a:solidFill>
-            </a:endParaRPr>
           </a:p>
         </p:txBody>
       </p:sp>
@@ -21023,13 +20834,6 @@
               </a:rPr>
               <a:t>Você trabalha? Com oque?</a:t>
             </a:r>
-            <a:endParaRPr lang="pt-BR" sz="1050" dirty="0" smtClean="0">
-              <a:solidFill>
-                <a:schemeClr val="tx2">
-                  <a:lumMod val="75000"/>
-                </a:schemeClr>
-              </a:solidFill>
-            </a:endParaRPr>
           </a:p>
         </p:txBody>
       </p:sp>
@@ -22097,11 +21901,6 @@
               </a:rPr>
               <a:t>Remover</a:t>
             </a:r>
-            <a:endParaRPr lang="pt-BR" sz="1050" dirty="0" smtClean="0">
-              <a:solidFill>
-                <a:schemeClr val="bg1"/>
-              </a:solidFill>
-            </a:endParaRPr>
           </a:p>
         </p:txBody>
       </p:sp>
@@ -22290,17 +22089,7 @@
                   </a:schemeClr>
                 </a:solidFill>
               </a:rPr>
-              <a:t>Alternativa </a:t>
-            </a:r>
-            <a:r>
-              <a:rPr lang="pt-BR" sz="900" dirty="0" smtClean="0">
-                <a:solidFill>
-                  <a:schemeClr val="tx2">
-                    <a:lumMod val="75000"/>
-                  </a:schemeClr>
-                </a:solidFill>
-              </a:rPr>
-              <a:t>D</a:t>
+              <a:t>Alternativa D</a:t>
             </a:r>
             <a:endParaRPr lang="pt-BR" sz="1000" dirty="0" smtClean="0">
               <a:solidFill>
@@ -22365,11 +22154,6 @@
               </a:rPr>
               <a:t>Competências</a:t>
             </a:r>
-            <a:endParaRPr lang="pt-BR" sz="1100" dirty="0" smtClean="0">
-              <a:solidFill>
-                <a:schemeClr val="bg1"/>
-              </a:solidFill>
-            </a:endParaRPr>
           </a:p>
         </p:txBody>
       </p:sp>
@@ -22594,11 +22378,6 @@
               </a:rPr>
               <a:t>Competências</a:t>
             </a:r>
-            <a:endParaRPr lang="pt-BR" sz="1100" dirty="0" smtClean="0">
-              <a:solidFill>
-                <a:schemeClr val="bg1"/>
-              </a:solidFill>
-            </a:endParaRPr>
           </a:p>
         </p:txBody>
       </p:sp>

</xml_diff>